<commit_message>
added something for 2NF
</commit_message>
<xml_diff>
--- a/Minibase/FinalProject/FinalPresentation.pptx
+++ b/Minibase/FinalProject/FinalPresentation.pptx
@@ -3353,7 +3353,7 @@
         </p:spPr>
         <p:txBody>
           <a:bodyPr vert="horz" lIns="91440" tIns="45720" rIns="91440" bIns="45720" rtlCol="0">
-            <a:normAutofit/>
+            <a:normAutofit fontScale="32500" lnSpcReduction="20000"/>
           </a:bodyPr>
           <a:lstStyle>
             <a:lvl1pPr marL="342900" indent="-342900" algn="l" defTabSz="914400" rtl="0" eaLnBrk="1" latinLnBrk="0" hangingPunct="1">
@@ -3493,9 +3493,404 @@
             </a:lvl9pPr>
           </a:lstStyle>
           <a:p>
+            <a:endParaRPr lang="en-US" dirty="0"/>
+          </a:p>
+          <a:p>
+            <a:endParaRPr lang="en-US" dirty="0" smtClean="0"/>
+          </a:p>
+          <a:p>
+            <a:endParaRPr lang="en-US" dirty="0"/>
+          </a:p>
+          <a:p>
+            <a:endParaRPr lang="en-US" dirty="0" smtClean="0"/>
+          </a:p>
+          <a:p>
+            <a:endParaRPr lang="en-US" dirty="0" smtClean="0"/>
+          </a:p>
+          <a:p>
+            <a:endParaRPr lang="en-US" dirty="0"/>
+          </a:p>
+          <a:p>
+            <a:endParaRPr lang="en-US" dirty="0" smtClean="0"/>
+          </a:p>
+          <a:p>
+            <a:endParaRPr lang="en-US" dirty="0" smtClean="0"/>
+          </a:p>
+          <a:p>
+            <a:endParaRPr lang="en-US" dirty="0"/>
+          </a:p>
+          <a:p>
+            <a:endParaRPr lang="en-US" dirty="0" smtClean="0"/>
+          </a:p>
+          <a:p>
+            <a:endParaRPr lang="en-US" dirty="0"/>
+          </a:p>
+          <a:p>
+            <a:endParaRPr lang="en-US" dirty="0" smtClean="0"/>
+          </a:p>
+          <a:p>
+            <a:endParaRPr lang="en-US" dirty="0"/>
+          </a:p>
+          <a:p>
+            <a:endParaRPr lang="en-US" dirty="0" smtClean="0"/>
+          </a:p>
+          <a:p>
+            <a:pPr marL="0" indent="0">
+              <a:buNone/>
+            </a:pPr>
             <a:r>
               <a:rPr lang="en-US" dirty="0" smtClean="0"/>
-              <a:t>…….</a:t>
+              <a:t>In our initial schema we had the following tables:</a:t>
+            </a:r>
+            <a:endParaRPr lang="en-US" dirty="0" smtClean="0"/>
+          </a:p>
+          <a:p>
+            <a:endParaRPr lang="en-US" dirty="0" smtClean="0"/>
+          </a:p>
+          <a:p>
+            <a:pPr marL="514350" lvl="0" indent="-514350">
+              <a:buFont typeface="+mj-lt"/>
+              <a:buAutoNum type="arabicPeriod"/>
+            </a:pPr>
+            <a:r>
+              <a:rPr lang="en-US" b="1" dirty="0" err="1"/>
+              <a:t>GroupCommentLike</a:t>
+            </a:r>
+            <a:r>
+              <a:rPr lang="en-US" dirty="0"/>
+              <a:t>[</a:t>
+            </a:r>
+            <a:r>
+              <a:rPr lang="en-US" u="sng" dirty="0" err="1"/>
+              <a:t>user_id</a:t>
+            </a:r>
+            <a:r>
+              <a:rPr lang="en-US" dirty="0"/>
+              <a:t>, </a:t>
+            </a:r>
+            <a:r>
+              <a:rPr lang="en-US" u="sng" dirty="0" err="1"/>
+              <a:t>group_Comment_id</a:t>
+            </a:r>
+            <a:r>
+              <a:rPr lang="en-US" dirty="0"/>
+              <a:t>, </a:t>
+            </a:r>
+            <a:r>
+              <a:rPr lang="en-US" dirty="0" err="1"/>
+              <a:t>group_id</a:t>
+            </a:r>
+            <a:r>
+              <a:rPr lang="en-US" dirty="0"/>
+              <a:t>]</a:t>
+            </a:r>
+          </a:p>
+          <a:p>
+            <a:pPr marL="514350" lvl="0" indent="-514350">
+              <a:buFont typeface="+mj-lt"/>
+              <a:buAutoNum type="arabicPeriod"/>
+            </a:pPr>
+            <a:r>
+              <a:rPr lang="en-US" b="1" dirty="0" err="1"/>
+              <a:t>UserGroups</a:t>
+            </a:r>
+            <a:r>
+              <a:rPr lang="en-US" dirty="0"/>
+              <a:t>[</a:t>
+            </a:r>
+            <a:r>
+              <a:rPr lang="en-US" u="sng" dirty="0" err="1"/>
+              <a:t>group_id</a:t>
+            </a:r>
+            <a:r>
+              <a:rPr lang="en-US" dirty="0"/>
+              <a:t>, </a:t>
+            </a:r>
+            <a:r>
+              <a:rPr lang="en-US" dirty="0" err="1"/>
+              <a:t>founder_id</a:t>
+            </a:r>
+            <a:r>
+              <a:rPr lang="en-US" dirty="0"/>
+              <a:t>, </a:t>
+            </a:r>
+            <a:r>
+              <a:rPr lang="en-US" dirty="0" err="1"/>
+              <a:t>founding_date</a:t>
+            </a:r>
+            <a:r>
+              <a:rPr lang="en-US" dirty="0"/>
+              <a:t>, </a:t>
+            </a:r>
+            <a:r>
+              <a:rPr lang="en-US" dirty="0" err="1"/>
+              <a:t>groupname</a:t>
+            </a:r>
+            <a:r>
+              <a:rPr lang="en-US" dirty="0"/>
+              <a:t>, </a:t>
+            </a:r>
+            <a:r>
+              <a:rPr lang="en-US" dirty="0" err="1"/>
+              <a:t>group_pic_id</a:t>
+            </a:r>
+            <a:r>
+              <a:rPr lang="en-US" dirty="0"/>
+              <a:t>, </a:t>
+            </a:r>
+            <a:r>
+              <a:rPr lang="en-US" dirty="0" err="1"/>
+              <a:t>about_text</a:t>
+            </a:r>
+            <a:r>
+              <a:rPr lang="en-US" dirty="0"/>
+              <a:t>]</a:t>
+            </a:r>
+          </a:p>
+          <a:p>
+            <a:pPr marL="514350" lvl="0" indent="-514350">
+              <a:buFont typeface="+mj-lt"/>
+              <a:buAutoNum type="arabicPeriod"/>
+            </a:pPr>
+            <a:r>
+              <a:rPr lang="en-US" b="1" dirty="0" err="1"/>
+              <a:t>GroupComments</a:t>
+            </a:r>
+            <a:r>
+              <a:rPr lang="en-US" dirty="0"/>
+              <a:t>[</a:t>
+            </a:r>
+            <a:r>
+              <a:rPr lang="en-US" u="sng" dirty="0" err="1"/>
+              <a:t>comment_id</a:t>
+            </a:r>
+            <a:r>
+              <a:rPr lang="en-US" dirty="0"/>
+              <a:t>, </a:t>
+            </a:r>
+            <a:r>
+              <a:rPr lang="en-US" dirty="0" err="1"/>
+              <a:t>user_id</a:t>
+            </a:r>
+            <a:r>
+              <a:rPr lang="en-US" dirty="0"/>
+              <a:t>, </a:t>
+            </a:r>
+            <a:r>
+              <a:rPr lang="en-US" dirty="0" err="1"/>
+              <a:t>group_id</a:t>
+            </a:r>
+            <a:r>
+              <a:rPr lang="en-US" dirty="0"/>
+              <a:t>, </a:t>
+            </a:r>
+            <a:r>
+              <a:rPr lang="en-US" dirty="0" err="1"/>
+              <a:t>comment_text</a:t>
+            </a:r>
+            <a:r>
+              <a:rPr lang="en-US" dirty="0"/>
+              <a:t>]</a:t>
+            </a:r>
+          </a:p>
+          <a:p>
+            <a:pPr marL="514350" lvl="0" indent="-514350">
+              <a:buFont typeface="+mj-lt"/>
+              <a:buAutoNum type="arabicPeriod"/>
+            </a:pPr>
+            <a:r>
+              <a:rPr lang="en-US" b="1" dirty="0" err="1"/>
+              <a:t>EventCommentLike</a:t>
+            </a:r>
+            <a:r>
+              <a:rPr lang="en-US" dirty="0"/>
+              <a:t>[</a:t>
+            </a:r>
+            <a:r>
+              <a:rPr lang="en-US" dirty="0" err="1"/>
+              <a:t>user_id</a:t>
+            </a:r>
+            <a:r>
+              <a:rPr lang="en-US" dirty="0"/>
+              <a:t>, </a:t>
+            </a:r>
+            <a:r>
+              <a:rPr lang="en-US" dirty="0" err="1"/>
+              <a:t>comment_id</a:t>
+            </a:r>
+            <a:r>
+              <a:rPr lang="en-US" dirty="0"/>
+              <a:t>, </a:t>
+            </a:r>
+            <a:r>
+              <a:rPr lang="en-US" dirty="0" err="1"/>
+              <a:t>event_id</a:t>
+            </a:r>
+            <a:r>
+              <a:rPr lang="en-US" dirty="0"/>
+              <a:t>]</a:t>
+            </a:r>
+          </a:p>
+          <a:p>
+            <a:pPr marL="514350" lvl="0" indent="-514350">
+              <a:buFont typeface="+mj-lt"/>
+              <a:buAutoNum type="arabicPeriod"/>
+            </a:pPr>
+            <a:r>
+              <a:rPr lang="en-US" b="1" dirty="0"/>
+              <a:t>Events</a:t>
+            </a:r>
+            <a:r>
+              <a:rPr lang="en-US" dirty="0"/>
+              <a:t>[</a:t>
+            </a:r>
+            <a:r>
+              <a:rPr lang="en-US" u="sng" dirty="0" err="1"/>
+              <a:t>event_id</a:t>
+            </a:r>
+            <a:r>
+              <a:rPr lang="en-US" dirty="0"/>
+              <a:t>, </a:t>
+            </a:r>
+            <a:r>
+              <a:rPr lang="en-US" dirty="0" err="1"/>
+              <a:t>eventdate</a:t>
+            </a:r>
+            <a:r>
+              <a:rPr lang="en-US" dirty="0"/>
+              <a:t>, </a:t>
+            </a:r>
+            <a:r>
+              <a:rPr lang="en-US" dirty="0" err="1"/>
+              <a:t>eventname</a:t>
+            </a:r>
+            <a:r>
+              <a:rPr lang="en-US" dirty="0"/>
+              <a:t>, </a:t>
+            </a:r>
+            <a:r>
+              <a:rPr lang="en-US" dirty="0" err="1"/>
+              <a:t>host_id</a:t>
+            </a:r>
+            <a:r>
+              <a:rPr lang="en-US" dirty="0"/>
+              <a:t>, </a:t>
+            </a:r>
+            <a:r>
+              <a:rPr lang="en-US" dirty="0" err="1"/>
+              <a:t>event_pic_id</a:t>
+            </a:r>
+            <a:r>
+              <a:rPr lang="en-US" dirty="0"/>
+              <a:t>]</a:t>
+            </a:r>
+          </a:p>
+          <a:p>
+            <a:pPr marL="514350" lvl="0" indent="-514350">
+              <a:buFont typeface="+mj-lt"/>
+              <a:buAutoNum type="arabicPeriod"/>
+            </a:pPr>
+            <a:r>
+              <a:rPr lang="en-US" b="1" dirty="0" err="1" smtClean="0"/>
+              <a:t>EventComments</a:t>
+            </a:r>
+            <a:r>
+              <a:rPr lang="en-US" dirty="0" smtClean="0"/>
+              <a:t>[</a:t>
+            </a:r>
+            <a:r>
+              <a:rPr lang="en-US" u="sng" dirty="0" err="1" smtClean="0"/>
+              <a:t>comment_id</a:t>
+            </a:r>
+            <a:r>
+              <a:rPr lang="en-US" dirty="0" smtClean="0"/>
+              <a:t>, </a:t>
+            </a:r>
+            <a:r>
+              <a:rPr lang="en-US" dirty="0" err="1" smtClean="0"/>
+              <a:t>user_id</a:t>
+            </a:r>
+            <a:r>
+              <a:rPr lang="en-US" dirty="0" smtClean="0"/>
+              <a:t>, </a:t>
+            </a:r>
+            <a:r>
+              <a:rPr lang="en-US" dirty="0" err="1" smtClean="0"/>
+              <a:t>event_id</a:t>
+            </a:r>
+            <a:r>
+              <a:rPr lang="en-US" dirty="0" smtClean="0"/>
+              <a:t>, </a:t>
+            </a:r>
+            <a:r>
+              <a:rPr lang="en-US" dirty="0" err="1" smtClean="0"/>
+              <a:t>comment_text</a:t>
+            </a:r>
+            <a:r>
+              <a:rPr lang="en-US" dirty="0" smtClean="0"/>
+              <a:t>]</a:t>
+            </a:r>
+          </a:p>
+          <a:p>
+            <a:pPr marL="514350" lvl="0" indent="-514350">
+              <a:buFont typeface="+mj-lt"/>
+              <a:buAutoNum type="arabicPeriod"/>
+            </a:pPr>
+            <a:endParaRPr lang="en-US" dirty="0" smtClean="0"/>
+          </a:p>
+          <a:p>
+            <a:pPr marL="514350" lvl="0" indent="-514350">
+              <a:buFont typeface="+mj-lt"/>
+              <a:buAutoNum type="arabicPeriod"/>
+            </a:pPr>
+            <a:endParaRPr lang="en-US" dirty="0" smtClean="0"/>
+          </a:p>
+          <a:p>
+            <a:pPr marL="0" indent="0">
+              <a:buNone/>
+            </a:pPr>
+            <a:r>
+              <a:rPr lang="en-US" dirty="0" smtClean="0"/>
+              <a:t>In </a:t>
+            </a:r>
+            <a:r>
+              <a:rPr lang="en-US" dirty="0"/>
+              <a:t>table 1, </a:t>
+            </a:r>
+            <a:r>
+              <a:rPr lang="en-US" dirty="0" err="1"/>
+              <a:t>group_comment_id</a:t>
+            </a:r>
+            <a:r>
+              <a:rPr lang="en-US" dirty="0"/>
+              <a:t> is dependent on </a:t>
+            </a:r>
+            <a:r>
+              <a:rPr lang="en-US" dirty="0" err="1"/>
+              <a:t>group_id</a:t>
+            </a:r>
+            <a:r>
+              <a:rPr lang="en-US" dirty="0"/>
+              <a:t>, since the group ID can be derived from the group comment ID. The same thing is valid for table 4 with the event ID.</a:t>
+            </a:r>
+          </a:p>
+          <a:p>
+            <a:pPr marL="0" indent="0">
+              <a:buNone/>
+            </a:pPr>
+            <a:endParaRPr lang="en-US" dirty="0"/>
+          </a:p>
+          <a:p>
+            <a:pPr marL="0" indent="0">
+              <a:buNone/>
+            </a:pPr>
+            <a:r>
+              <a:rPr lang="en-US" dirty="0"/>
+              <a:t>As a solution, we completely removed the group ID because it carried redundant data that was already included in the group comment ID</a:t>
+            </a:r>
+            <a:r>
+              <a:rPr lang="en-US" dirty="0" smtClean="0"/>
+              <a:t>.</a:t>
             </a:r>
             <a:endParaRPr lang="en-US" dirty="0"/>
           </a:p>
@@ -3928,11 +4323,7 @@
             </a:r>
             <a:r>
               <a:rPr lang="en-US" sz="2800" dirty="0" smtClean="0"/>
-              <a:t>, </a:t>
-            </a:r>
-            <a:r>
-              <a:rPr lang="en-US" sz="2800" dirty="0" smtClean="0"/>
-              <a:t>joindate, username, password, profile_pic_id]</a:t>
+              <a:t>, joindate, username, password, profile_pic_id]</a:t>
             </a:r>
           </a:p>
           <a:p>
@@ -3992,19 +4383,7 @@
             </a:r>
             <a:r>
               <a:rPr lang="en-US" sz="2800" dirty="0" smtClean="0"/>
-              <a:t>, uploaddate</a:t>
-            </a:r>
-            <a:r>
-              <a:rPr lang="en-US" sz="2800" dirty="0" smtClean="0"/>
-              <a:t>, uploadname, caption, filelocation, </a:t>
-            </a:r>
-            <a:r>
-              <a:rPr lang="en-US" sz="2800" dirty="0" smtClean="0"/>
-              <a:t>owner_id, album_id</a:t>
-            </a:r>
-            <a:r>
-              <a:rPr lang="en-US" sz="2800" dirty="0" smtClean="0"/>
-              <a:t>]</a:t>
+              <a:t>, uploaddate, uploadname, caption, filelocation, owner_id, album_id]</a:t>
             </a:r>
             <a:endParaRPr lang="en-US" sz="2800" dirty="0"/>
           </a:p>
@@ -4031,23 +4410,7 @@
             </a:r>
             <a:r>
               <a:rPr lang="en-US" sz="2800" dirty="0" smtClean="0"/>
-              <a:t>, </a:t>
-            </a:r>
-            <a:r>
-              <a:rPr lang="en-US" sz="2800" dirty="0" smtClean="0"/>
-              <a:t>userID, </a:t>
-            </a:r>
-            <a:r>
-              <a:rPr lang="en-US" sz="2800" dirty="0" smtClean="0"/>
-              <a:t>photo_id</a:t>
-            </a:r>
-            <a:r>
-              <a:rPr lang="en-US" sz="2800" dirty="0" smtClean="0"/>
-              <a:t>, comment_text</a:t>
-            </a:r>
-            <a:r>
-              <a:rPr lang="en-US" sz="2800" dirty="0" smtClean="0"/>
-              <a:t>]</a:t>
+              <a:t>, userID, photo_id, comment_text]</a:t>
             </a:r>
             <a:endParaRPr lang="en-US" sz="2800" dirty="0"/>
           </a:p>
@@ -4119,7 +4482,6 @@
               <a:rPr lang="en-US" sz="2800" dirty="0" smtClean="0"/>
               <a:t>]</a:t>
             </a:r>
-            <a:endParaRPr lang="en-US" sz="2800" dirty="0" smtClean="0"/>
           </a:p>
           <a:p>
             <a:pPr marL="514350" indent="-514350">
@@ -4144,23 +4506,7 @@
             </a:r>
             <a:r>
               <a:rPr lang="en-US" sz="2800" dirty="0" smtClean="0"/>
-              <a:t>, founder_id, founding_date</a:t>
-            </a:r>
-            <a:r>
-              <a:rPr lang="en-US" sz="2800" dirty="0" smtClean="0"/>
-              <a:t>, </a:t>
-            </a:r>
-            <a:r>
-              <a:rPr lang="en-US" sz="2800" dirty="0" smtClean="0"/>
-              <a:t>groupname, group_pic_id, </a:t>
-            </a:r>
-            <a:r>
-              <a:rPr lang="en-US" sz="2800" dirty="0" smtClean="0"/>
-              <a:t>about_text</a:t>
-            </a:r>
-            <a:r>
-              <a:rPr lang="en-US" sz="2800" dirty="0" smtClean="0"/>
-              <a:t>]</a:t>
+              <a:t>, founder_id, founding_date, groupname, group_pic_id, about_text]</a:t>
             </a:r>
             <a:endParaRPr lang="en-US" sz="2800" dirty="0"/>
           </a:p>
@@ -4473,7 +4819,6 @@
               <a:rPr lang="en-US" sz="2800" dirty="0" smtClean="0"/>
               <a:t>[user_id, comment_id]</a:t>
             </a:r>
-            <a:endParaRPr lang="en-US" sz="2800" dirty="0" smtClean="0"/>
           </a:p>
           <a:p>
             <a:pPr marL="514350" indent="-514350">
@@ -4506,11 +4851,7 @@
             </a:r>
             <a:r>
               <a:rPr lang="en-US" sz="2800" dirty="0" smtClean="0"/>
-              <a:t>, </a:t>
-            </a:r>
-            <a:r>
-              <a:rPr lang="en-US" sz="2800" dirty="0" smtClean="0"/>
-              <a:t>description]</a:t>
+              <a:t>, description]</a:t>
             </a:r>
             <a:endParaRPr lang="en-US" sz="2800" dirty="0"/>
           </a:p>

</xml_diff>